<commit_message>
updated project report and scrum document
</commit_message>
<xml_diff>
--- a/Documents/EndPresentation.pptx
+++ b/Documents/EndPresentation.pptx
@@ -365,7 +365,7 @@
             <a:fld id="{E1CA15AE-E040-4F31-96C6-FD066D034FFB}" type="datetime1">
               <a:rPr lang="en-GB" smtClean="0"/>
               <a:pPr/>
-              <a:t>20/12/2023</a:t>
+              <a:t>22/12/2023</a:t>
             </a:fld>
             <a:endParaRPr lang="en-GB" dirty="0"/>
           </a:p>
@@ -911,7 +911,7 @@
               <a:rPr lang="en-GB" noProof="0" smtClean="0">
                 <a:latin typeface="+mn-lt"/>
               </a:rPr>
-              <a:t>20 December, 2023</a:t>
+              <a:t>22 December, 2023</a:t>
             </a:fld>
             <a:endParaRPr lang="en-GB" noProof="0">
               <a:latin typeface="+mn-lt"/>
@@ -1264,7 +1264,7 @@
               <a:rPr lang="en-GB" noProof="0" smtClean="0">
                 <a:latin typeface="+mn-lt"/>
               </a:rPr>
-              <a:t>20 December, 2023</a:t>
+              <a:t>22 December, 2023</a:t>
             </a:fld>
             <a:endParaRPr lang="en-GB" noProof="0">
               <a:latin typeface="+mn-lt"/>
@@ -1680,7 +1680,7 @@
               <a:rPr lang="en-GB" noProof="0" smtClean="0">
                 <a:latin typeface="+mn-lt"/>
               </a:rPr>
-              <a:t>20 December, 2023</a:t>
+              <a:t>22 December, 2023</a:t>
             </a:fld>
             <a:endParaRPr lang="en-GB" noProof="0">
               <a:latin typeface="+mn-lt"/>
@@ -2031,7 +2031,7 @@
               <a:rPr lang="en-GB" noProof="0" smtClean="0">
                 <a:latin typeface="+mn-lt"/>
               </a:rPr>
-              <a:t>20 December, 2023</a:t>
+              <a:t>22 December, 2023</a:t>
             </a:fld>
             <a:endParaRPr lang="en-GB" noProof="0">
               <a:latin typeface="+mn-lt"/>
@@ -2366,7 +2366,7 @@
               <a:rPr lang="en-GB" noProof="0" smtClean="0">
                 <a:latin typeface="+mn-lt"/>
               </a:rPr>
-              <a:t>20 December, 2023</a:t>
+              <a:t>22 December, 2023</a:t>
             </a:fld>
             <a:endParaRPr lang="en-GB" noProof="0">
               <a:latin typeface="+mn-lt"/>
@@ -2777,7 +2777,7 @@
               <a:rPr lang="en-GB" noProof="0" smtClean="0">
                 <a:latin typeface="+mn-lt"/>
               </a:rPr>
-              <a:t>20 December, 2023</a:t>
+              <a:t>22 December, 2023</a:t>
             </a:fld>
             <a:endParaRPr lang="en-GB" noProof="0">
               <a:latin typeface="+mn-lt"/>
@@ -3049,7 +3049,7 @@
               <a:rPr lang="en-GB" noProof="0" smtClean="0">
                 <a:latin typeface="+mn-lt"/>
               </a:rPr>
-              <a:t>20 December, 2023</a:t>
+              <a:t>22 December, 2023</a:t>
             </a:fld>
             <a:endParaRPr lang="en-GB" noProof="0">
               <a:latin typeface="+mn-lt"/>
@@ -3326,7 +3326,7 @@
               <a:rPr lang="en-GB" noProof="0" smtClean="0">
                 <a:latin typeface="+mn-lt"/>
               </a:rPr>
-              <a:t>20 December, 2023</a:t>
+              <a:t>22 December, 2023</a:t>
             </a:fld>
             <a:endParaRPr lang="en-GB" noProof="0">
               <a:latin typeface="+mn-lt"/>
@@ -5528,7 +5528,7 @@
               <a:rPr lang="en-GB" noProof="0" smtClean="0">
                 <a:latin typeface="+mn-lt"/>
               </a:rPr>
-              <a:t>20 December, 2023</a:t>
+              <a:t>22 December, 2023</a:t>
             </a:fld>
             <a:endParaRPr lang="en-GB" noProof="0" dirty="0">
               <a:latin typeface="+mn-lt"/>
@@ -6170,7 +6170,7 @@
               <a:rPr lang="en-GB" noProof="0" smtClean="0">
                 <a:latin typeface="+mn-lt"/>
               </a:rPr>
-              <a:t>20 December, 2023</a:t>
+              <a:t>22 December, 2023</a:t>
             </a:fld>
             <a:endParaRPr lang="en-GB" noProof="0" dirty="0">
               <a:latin typeface="+mn-lt"/>
@@ -6405,7 +6405,7 @@
               <a:rPr lang="en-GB" noProof="0" smtClean="0">
                 <a:latin typeface="+mn-lt"/>
               </a:rPr>
-              <a:t>20 December, 2023</a:t>
+              <a:t>22 December, 2023</a:t>
             </a:fld>
             <a:endParaRPr lang="en-GB" noProof="0">
               <a:latin typeface="+mn-lt"/>
@@ -7226,7 +7226,7 @@
               <a:rPr lang="en-GB" noProof="0" smtClean="0">
                 <a:latin typeface="+mn-lt"/>
               </a:rPr>
-              <a:t>20 December, 2023</a:t>
+              <a:t>22 December, 2023</a:t>
             </a:fld>
             <a:endParaRPr lang="en-GB" noProof="0">
               <a:latin typeface="+mn-lt"/>
@@ -7496,7 +7496,7 @@
               <a:rPr lang="en-GB" noProof="0" smtClean="0">
                 <a:latin typeface="+mn-lt"/>
               </a:rPr>
-              <a:t>20 December, 2023</a:t>
+              <a:t>22 December, 2023</a:t>
             </a:fld>
             <a:endParaRPr lang="en-GB" noProof="0">
               <a:latin typeface="+mn-lt"/>
@@ -10446,7 +10446,7 @@
               <a:rPr lang="en-GB" noProof="0" smtClean="0">
                 <a:latin typeface="+mn-lt"/>
               </a:rPr>
-              <a:t>20 December, 2023</a:t>
+              <a:t>22 December, 2023</a:t>
             </a:fld>
             <a:endParaRPr lang="en-GB" noProof="0" dirty="0">
               <a:latin typeface="+mn-lt"/>
@@ -11624,7 +11624,7 @@
               <a:rPr lang="en-GB" noProof="0" smtClean="0">
                 <a:latin typeface="+mn-lt"/>
               </a:rPr>
-              <a:t>20 December, 2023</a:t>
+              <a:t>22 December, 2023</a:t>
             </a:fld>
             <a:endParaRPr lang="en-GB" noProof="0">
               <a:latin typeface="+mn-lt"/>
@@ -12570,7 +12570,7 @@
               <a:rPr lang="en-GB" noProof="0" smtClean="0">
                 <a:latin typeface="+mn-lt"/>
               </a:rPr>
-              <a:t>20 December, 2023</a:t>
+              <a:t>22 December, 2023</a:t>
             </a:fld>
             <a:endParaRPr lang="en-GB" noProof="0" dirty="0">
               <a:latin typeface="+mn-lt"/>
@@ -13706,7 +13706,7 @@
               <a:rPr lang="en-GB" noProof="0" smtClean="0">
                 <a:latin typeface="+mn-lt"/>
               </a:rPr>
-              <a:t>20 December, 2023</a:t>
+              <a:t>22 December, 2023</a:t>
             </a:fld>
             <a:endParaRPr lang="en-GB" noProof="0" dirty="0">
               <a:latin typeface="+mn-lt"/>
@@ -14841,7 +14841,7 @@
               <a:rPr lang="en-GB" noProof="0" smtClean="0">
                 <a:latin typeface="+mn-lt"/>
               </a:rPr>
-              <a:t>20 December, 2023</a:t>
+              <a:t>22 December, 2023</a:t>
             </a:fld>
             <a:endParaRPr lang="en-GB" noProof="0" dirty="0">
               <a:latin typeface="+mn-lt"/>
@@ -15815,7 +15815,7 @@
               <a:rPr lang="en-GB" noProof="0" smtClean="0">
                 <a:latin typeface="+mn-lt"/>
               </a:rPr>
-              <a:t>20 December, 2023</a:t>
+              <a:t>22 December, 2023</a:t>
             </a:fld>
             <a:endParaRPr lang="en-GB" noProof="0">
               <a:latin typeface="+mn-lt"/>
@@ -16153,7 +16153,7 @@
               <a:rPr lang="en-GB" noProof="0" smtClean="0">
                 <a:latin typeface="+mn-lt"/>
               </a:rPr>
-              <a:t>20 December, 2023</a:t>
+              <a:t>22 December, 2023</a:t>
             </a:fld>
             <a:endParaRPr lang="en-GB" noProof="0">
               <a:latin typeface="+mn-lt"/>
@@ -16625,7 +16625,7 @@
               <a:rPr lang="en-GB" noProof="0" smtClean="0">
                 <a:latin typeface="+mn-lt"/>
               </a:rPr>
-              <a:t>20 December, 2023</a:t>
+              <a:t>22 December, 2023</a:t>
             </a:fld>
             <a:endParaRPr lang="en-GB" noProof="0">
               <a:latin typeface="+mn-lt"/>
@@ -16845,7 +16845,7 @@
               <a:rPr lang="en-GB" noProof="0" smtClean="0">
                 <a:latin typeface="+mn-lt"/>
               </a:rPr>
-              <a:t>20 December, 2023</a:t>
+              <a:t>22 December, 2023</a:t>
             </a:fld>
             <a:endParaRPr lang="en-GB" noProof="0">
               <a:latin typeface="+mn-lt"/>
@@ -17037,7 +17037,7 @@
               <a:rPr lang="en-GB" noProof="0" smtClean="0">
                 <a:latin typeface="+mn-lt"/>
               </a:rPr>
-              <a:t>20 December, 2023</a:t>
+              <a:t>22 December, 2023</a:t>
             </a:fld>
             <a:endParaRPr lang="en-GB" noProof="0">
               <a:latin typeface="+mn-lt"/>
@@ -17385,7 +17385,7 @@
               <a:rPr lang="en-GB" noProof="0" smtClean="0">
                 <a:latin typeface="+mn-lt"/>
               </a:rPr>
-              <a:t>20 December, 2023</a:t>
+              <a:t>22 December, 2023</a:t>
             </a:fld>
             <a:endParaRPr lang="en-GB" noProof="0">
               <a:latin typeface="+mn-lt"/>
@@ -17745,7 +17745,7 @@
               <a:rPr lang="en-GB" noProof="0" smtClean="0">
                 <a:latin typeface="+mn-lt"/>
               </a:rPr>
-              <a:t>20 December, 2023</a:t>
+              <a:t>22 December, 2023</a:t>
             </a:fld>
             <a:endParaRPr lang="en-GB" noProof="0">
               <a:latin typeface="+mn-lt"/>
@@ -19877,7 +19877,7 @@
               <a:rPr lang="en-GB" noProof="0" smtClean="0">
                 <a:latin typeface="+mn-lt"/>
               </a:rPr>
-              <a:t>20 December, 2023</a:t>
+              <a:t>22 December, 2023</a:t>
             </a:fld>
             <a:endParaRPr lang="en-GB" noProof="0">
               <a:latin typeface="+mn-lt"/>
@@ -21549,8 +21549,13 @@
           <a:p>
             <a:r>
               <a:rPr lang="nl-NL" dirty="0"/>
-              <a:t>De Move4vitality appa verifiëren</a:t>
+              <a:t>De </a:t>
             </a:r>
+            <a:r>
+              <a:rPr lang="nl-NL"/>
+              <a:t>Move4vitality app verifiëren</a:t>
+            </a:r>
+            <a:endParaRPr lang="nl-NL" dirty="0"/>
           </a:p>
           <a:p>
             <a:r>
@@ -22521,15 +22526,6 @@
 </file>
 
 <file path=customXml/item2.xml><?xml version="1.0" encoding="utf-8"?>
-<p:properties xmlns:p="http://schemas.microsoft.com/office/2006/metadata/properties" xmlns:xsi="http://www.w3.org/2001/XMLSchema-instance" xmlns:pc="http://schemas.microsoft.com/office/infopath/2007/PartnerControls">
-  <documentManagement>
-    <Status xmlns="71af3243-3dd4-4a8d-8c0d-dd76da1f02a5">Not started</Status>
-    <MediaServiceKeyPoints xmlns="71af3243-3dd4-4a8d-8c0d-dd76da1f02a5" xsi:nil="true"/>
-  </documentManagement>
-</p:properties>
-</file>
-
-<file path=customXml/item3.xml><?xml version="1.0" encoding="utf-8"?>
 <ct:contentTypeSchema xmlns:ct="http://schemas.microsoft.com/office/2006/metadata/contentType" xmlns:ma="http://schemas.microsoft.com/office/2006/metadata/properties/metaAttributes" ct:_="" ma:_="" ma:contentTypeName="Document" ma:contentTypeID="0x01010079F111ED35F8CC479449609E8A0923A6" ma:contentTypeVersion="12" ma:contentTypeDescription="Create a new document." ma:contentTypeScope="" ma:versionID="426e97fa315356fffbdcd9876fe988c2">
   <xsd:schema xmlns:xsd="http://www.w3.org/2001/XMLSchema" xmlns:xs="http://www.w3.org/2001/XMLSchema" xmlns:p="http://schemas.microsoft.com/office/2006/metadata/properties" xmlns:ns2="71af3243-3dd4-4a8d-8c0d-dd76da1f02a5" xmlns:ns3="16c05727-aa75-4e4a-9b5f-8a80a1165891" targetNamespace="http://schemas.microsoft.com/office/2006/metadata/properties" ma:root="true" ma:fieldsID="14b8f0def80e6d70ce3def20c90759ae" ns2:_="" ns3:_="">
     <xsd:import namespace="71af3243-3dd4-4a8d-8c0d-dd76da1f02a5"/>
@@ -22750,6 +22746,15 @@
 </ct:contentTypeSchema>
 </file>
 
+<file path=customXml/item3.xml><?xml version="1.0" encoding="utf-8"?>
+<p:properties xmlns:p="http://schemas.microsoft.com/office/2006/metadata/properties" xmlns:xsi="http://www.w3.org/2001/XMLSchema-instance" xmlns:pc="http://schemas.microsoft.com/office/infopath/2007/PartnerControls">
+  <documentManagement>
+    <Status xmlns="71af3243-3dd4-4a8d-8c0d-dd76da1f02a5">Not started</Status>
+    <MediaServiceKeyPoints xmlns="71af3243-3dd4-4a8d-8c0d-dd76da1f02a5" xsi:nil="true"/>
+  </documentManagement>
+</p:properties>
+</file>
+
 <file path=customXml/itemProps1.xml><?xml version="1.0" encoding="utf-8"?>
 <ds:datastoreItem xmlns:ds="http://schemas.openxmlformats.org/officeDocument/2006/customXml" ds:itemID="{1D20B6E4-879E-4E6C-BDE7-261540CD3765}">
   <ds:schemaRefs>
@@ -22759,16 +22764,6 @@
 </file>
 
 <file path=customXml/itemProps2.xml><?xml version="1.0" encoding="utf-8"?>
-<ds:datastoreItem xmlns:ds="http://schemas.openxmlformats.org/officeDocument/2006/customXml" ds:itemID="{09EC1AB0-9704-404D-B6D3-819D938AC55B}">
-  <ds:schemaRefs>
-    <ds:schemaRef ds:uri="http://schemas.microsoft.com/office/2006/metadata/properties"/>
-    <ds:schemaRef ds:uri="http://schemas.microsoft.com/office/infopath/2007/PartnerControls"/>
-    <ds:schemaRef ds:uri="71af3243-3dd4-4a8d-8c0d-dd76da1f02a5"/>
-  </ds:schemaRefs>
-</ds:datastoreItem>
-</file>
-
-<file path=customXml/itemProps3.xml><?xml version="1.0" encoding="utf-8"?>
 <ds:datastoreItem xmlns:ds="http://schemas.openxmlformats.org/officeDocument/2006/customXml" ds:itemID="{94F21D10-BD83-491A-AAA6-945C2DB1EB01}">
   <ds:schemaRefs>
     <ds:schemaRef ds:uri="http://schemas.microsoft.com/office/2006/metadata/contentType"/>
@@ -22785,4 +22780,14 @@
     <ds:schemaRef ds:uri="http://schemas.microsoft.com/internal/obd"/>
   </ds:schemaRefs>
 </ds:datastoreItem>
+</file>
+
+<file path=customXml/itemProps3.xml><?xml version="1.0" encoding="utf-8"?>
+<ds:datastoreItem xmlns:ds="http://schemas.openxmlformats.org/officeDocument/2006/customXml" ds:itemID="{09EC1AB0-9704-404D-B6D3-819D938AC55B}">
+  <ds:schemaRefs>
+    <ds:schemaRef ds:uri="http://schemas.microsoft.com/office/2006/metadata/properties"/>
+    <ds:schemaRef ds:uri="http://schemas.microsoft.com/office/infopath/2007/PartnerControls"/>
+    <ds:schemaRef ds:uri="71af3243-3dd4-4a8d-8c0d-dd76da1f02a5"/>
+  </ds:schemaRefs>
+</ds:datastoreItem>
 </file>
</xml_diff>